<commit_message>
Slightly edited github powerpoint
Updated Labview merge/diff stuff
Changed some language to make it more clear
</commit_message>
<xml_diff>
--- a/Documents/GitHub_Guide_2013.pptx
+++ b/Documents/GitHub_Guide_2013.pptx
@@ -217,7 +217,7 @@
           <a:p>
             <a:fld id="{43311573-2151-402E-AD6C-0E7C67381E91}" type="datetimeFigureOut">
               <a:rPr lang="en-US" smtClean="0"/>
-              <a:t>1/12/2013</a:t>
+              <a:t>13/06/13</a:t>
             </a:fld>
             <a:endParaRPr lang="en-US"/>
           </a:p>
@@ -918,7 +918,7 @@
           <a:p>
             <a:fld id="{6A17E6DD-30C4-4389-8E86-52BF372AB557}" type="datetimeFigureOut">
               <a:rPr lang="en-US" smtClean="0"/>
-              <a:t>1/12/2013</a:t>
+              <a:t>13/06/13</a:t>
             </a:fld>
             <a:endParaRPr lang="en-US"/>
           </a:p>
@@ -1088,7 +1088,7 @@
           <a:p>
             <a:fld id="{6A17E6DD-30C4-4389-8E86-52BF372AB557}" type="datetimeFigureOut">
               <a:rPr lang="en-US" smtClean="0"/>
-              <a:t>1/12/2013</a:t>
+              <a:t>13/06/13</a:t>
             </a:fld>
             <a:endParaRPr lang="en-US"/>
           </a:p>
@@ -1268,7 +1268,7 @@
           <a:p>
             <a:fld id="{6A17E6DD-30C4-4389-8E86-52BF372AB557}" type="datetimeFigureOut">
               <a:rPr lang="en-US" smtClean="0"/>
-              <a:t>1/12/2013</a:t>
+              <a:t>13/06/13</a:t>
             </a:fld>
             <a:endParaRPr lang="en-US"/>
           </a:p>
@@ -1438,7 +1438,7 @@
           <a:p>
             <a:fld id="{6A17E6DD-30C4-4389-8E86-52BF372AB557}" type="datetimeFigureOut">
               <a:rPr lang="en-US" smtClean="0"/>
-              <a:t>1/12/2013</a:t>
+              <a:t>13/06/13</a:t>
             </a:fld>
             <a:endParaRPr lang="en-US"/>
           </a:p>
@@ -1684,7 +1684,7 @@
           <a:p>
             <a:fld id="{6A17E6DD-30C4-4389-8E86-52BF372AB557}" type="datetimeFigureOut">
               <a:rPr lang="en-US" smtClean="0"/>
-              <a:t>1/12/2013</a:t>
+              <a:t>13/06/13</a:t>
             </a:fld>
             <a:endParaRPr lang="en-US"/>
           </a:p>
@@ -1972,7 +1972,7 @@
           <a:p>
             <a:fld id="{6A17E6DD-30C4-4389-8E86-52BF372AB557}" type="datetimeFigureOut">
               <a:rPr lang="en-US" smtClean="0"/>
-              <a:t>1/12/2013</a:t>
+              <a:t>13/06/13</a:t>
             </a:fld>
             <a:endParaRPr lang="en-US"/>
           </a:p>
@@ -2394,7 +2394,7 @@
           <a:p>
             <a:fld id="{6A17E6DD-30C4-4389-8E86-52BF372AB557}" type="datetimeFigureOut">
               <a:rPr lang="en-US" smtClean="0"/>
-              <a:t>1/12/2013</a:t>
+              <a:t>13/06/13</a:t>
             </a:fld>
             <a:endParaRPr lang="en-US"/>
           </a:p>
@@ -2512,7 +2512,7 @@
           <a:p>
             <a:fld id="{6A17E6DD-30C4-4389-8E86-52BF372AB557}" type="datetimeFigureOut">
               <a:rPr lang="en-US" smtClean="0"/>
-              <a:t>1/12/2013</a:t>
+              <a:t>13/06/13</a:t>
             </a:fld>
             <a:endParaRPr lang="en-US"/>
           </a:p>
@@ -2607,7 +2607,7 @@
           <a:p>
             <a:fld id="{6A17E6DD-30C4-4389-8E86-52BF372AB557}" type="datetimeFigureOut">
               <a:rPr lang="en-US" smtClean="0"/>
-              <a:t>1/12/2013</a:t>
+              <a:t>13/06/13</a:t>
             </a:fld>
             <a:endParaRPr lang="en-US"/>
           </a:p>
@@ -2884,7 +2884,7 @@
           <a:p>
             <a:fld id="{6A17E6DD-30C4-4389-8E86-52BF372AB557}" type="datetimeFigureOut">
               <a:rPr lang="en-US" smtClean="0"/>
-              <a:t>1/12/2013</a:t>
+              <a:t>13/06/13</a:t>
             </a:fld>
             <a:endParaRPr lang="en-US"/>
           </a:p>
@@ -3137,7 +3137,7 @@
           <a:p>
             <a:fld id="{6A17E6DD-30C4-4389-8E86-52BF372AB557}" type="datetimeFigureOut">
               <a:rPr lang="en-US" smtClean="0"/>
-              <a:t>1/12/2013</a:t>
+              <a:t>13/06/13</a:t>
             </a:fld>
             <a:endParaRPr lang="en-US"/>
           </a:p>
@@ -3350,7 +3350,7 @@
           <a:p>
             <a:fld id="{6A17E6DD-30C4-4389-8E86-52BF372AB557}" type="datetimeFigureOut">
               <a:rPr lang="en-US" smtClean="0"/>
-              <a:t>1/12/2013</a:t>
+              <a:t>13/06/13</a:t>
             </a:fld>
             <a:endParaRPr lang="en-US"/>
           </a:p>
@@ -3822,15 +3822,11 @@
           <a:p>
             <a:r>
               <a:rPr lang="en-US" dirty="0" smtClean="0"/>
-              <a:t>Last </a:t>
-            </a:r>
-            <a:r>
-              <a:rPr lang="en-US" smtClean="0"/>
-              <a:t>updated </a:t>
-            </a:r>
-            <a:r>
-              <a:rPr lang="en-US" smtClean="0"/>
-              <a:t>2013/01/12</a:t>
+              <a:t>Last updated </a:t>
+            </a:r>
+            <a:r>
+              <a:rPr lang="en-US" dirty="0" smtClean="0"/>
+              <a:t>2013/06/13</a:t>
             </a:r>
             <a:endParaRPr lang="en-US" dirty="0"/>
           </a:p>
@@ -4122,16 +4118,25 @@
             </a:r>
             <a:r>
               <a:rPr lang="en-US" sz="2000" dirty="0" smtClean="0"/>
-              <a:t>), and should be done on </a:t>
+              <a:t>), and </a:t>
+            </a:r>
+            <a:r>
+              <a:rPr lang="en-US" sz="2000" dirty="0" smtClean="0"/>
+              <a:t>can only</a:t>
+            </a:r>
+            <a:r>
+              <a:rPr lang="en-US" sz="2000" dirty="0" smtClean="0"/>
+              <a:t> </a:t>
+            </a:r>
+            <a:r>
+              <a:rPr lang="en-US" sz="2000" dirty="0" smtClean="0"/>
+              <a:t>be done on </a:t>
             </a:r>
             <a:r>
               <a:rPr lang="en-US" sz="2000" dirty="0" err="1" smtClean="0"/>
               <a:t>GitHub</a:t>
             </a:r>
-            <a:r>
-              <a:rPr lang="en-US" sz="2000" dirty="0" smtClean="0"/>
-              <a:t> site</a:t>
-            </a:r>
+            <a:endParaRPr lang="en-US" sz="2000" dirty="0" smtClean="0"/>
           </a:p>
           <a:p>
             <a:pPr lvl="1"/>
@@ -4141,7 +4146,15 @@
             </a:r>
             <a:r>
               <a:rPr lang="en-US" sz="2000" dirty="0" smtClean="0"/>
-              <a:t> actually sets up a whole discussion board for all developers to discuss together</a:t>
+              <a:t> </a:t>
+            </a:r>
+            <a:r>
+              <a:rPr lang="en-US" sz="2000" dirty="0" smtClean="0"/>
+              <a:t>also sets </a:t>
+            </a:r>
+            <a:r>
+              <a:rPr lang="en-US" sz="2000" dirty="0" smtClean="0"/>
+              <a:t>up a whole discussion board for all developers to discuss together</a:t>
             </a:r>
           </a:p>
           <a:p>
@@ -8906,22 +8919,30 @@
           </a:p>
           <a:p>
             <a:r>
+              <a:rPr lang="en-US" sz="2400" dirty="0" err="1" smtClean="0"/>
+              <a:t>Git</a:t>
+            </a:r>
+            <a:r>
               <a:rPr lang="en-US" sz="2400" dirty="0" smtClean="0"/>
-              <a:t>It might not be able to smoothly merge two modifications to the same .vi file (merge) or easily compare differences between two different versions of a .vi files (diff).</a:t>
-            </a:r>
-          </a:p>
-        </p:txBody>
-      </p:sp>
-      <p:sp>
-        <p:nvSpPr>
-          <p:cNvPr id="9" name="TextBox 8"/>
+              <a:t> is unable </a:t>
+            </a:r>
+            <a:r>
+              <a:rPr lang="en-US" sz="2400" dirty="0" smtClean="0"/>
+              <a:t>to smoothly merge two modifications to the same .vi file (merge) or easily compare differences between two different versions of a .vi files (diff).</a:t>
+            </a:r>
+          </a:p>
+        </p:txBody>
+      </p:sp>
+      <p:sp>
+        <p:nvSpPr>
+          <p:cNvPr id="2" name="TextBox 1"/>
           <p:cNvSpPr txBox="1"/>
           <p:nvPr/>
         </p:nvSpPr>
         <p:spPr>
           <a:xfrm>
-            <a:off x="3048000" y="6488668"/>
-            <a:ext cx="3200400" cy="369332"/>
+            <a:off x="838200" y="5140411"/>
+            <a:ext cx="7467600" cy="1015663"/>
           </a:xfrm>
           <a:prstGeom prst="rect">
             <a:avLst/>
@@ -8936,59 +8957,28 @@
           <a:p>
             <a:pPr algn="ctr"/>
             <a:r>
-              <a:rPr lang="en-US" dirty="0" smtClean="0"/>
-              <a:t>As of 11/25/2012</a:t>
-            </a:r>
-            <a:endParaRPr lang="en-US" dirty="0"/>
-          </a:p>
-        </p:txBody>
-      </p:sp>
-      <p:sp>
-        <p:nvSpPr>
-          <p:cNvPr id="2" name="TextBox 1"/>
-          <p:cNvSpPr txBox="1"/>
-          <p:nvPr/>
-        </p:nvSpPr>
-        <p:spPr>
-          <a:xfrm>
-            <a:off x="838200" y="5140411"/>
-            <a:ext cx="7467600" cy="1323439"/>
-          </a:xfrm>
-          <a:prstGeom prst="rect">
-            <a:avLst/>
-          </a:prstGeom>
-          <a:noFill/>
-        </p:spPr>
-        <p:txBody>
-          <a:bodyPr wrap="square" rtlCol="0">
-            <a:spAutoFit/>
-          </a:bodyPr>
-          <a:lstStyle/>
-          <a:p>
-            <a:pPr algn="ctr"/>
-            <a:r>
-              <a:rPr lang="en-US" sz="2000" dirty="0"/>
-              <a:t>However, this </a:t>
-            </a:r>
-            <a:r>
               <a:rPr lang="en-US" sz="2000" dirty="0" smtClean="0"/>
-              <a:t>is all </a:t>
-            </a:r>
-            <a:r>
-              <a:rPr lang="en-US" sz="2000" dirty="0"/>
-              <a:t>assuming our version of </a:t>
-            </a:r>
-            <a:r>
-              <a:rPr lang="en-US" sz="2000" dirty="0" err="1"/>
-              <a:t>LabView</a:t>
-            </a:r>
-            <a:r>
-              <a:rPr lang="en-US" sz="2000" dirty="0"/>
-              <a:t> will not have merge/diff </a:t>
+              <a:t>Even though </a:t>
+            </a:r>
+            <a:r>
+              <a:rPr lang="en-US" sz="2000" dirty="0" err="1" smtClean="0"/>
+              <a:t>Labview</a:t>
             </a:r>
             <a:r>
               <a:rPr lang="en-US" sz="2000" dirty="0" smtClean="0"/>
-              <a:t>features. Even if it does, they will not be integrated with </a:t>
+              <a:t> has merge/diff tools, </a:t>
+            </a:r>
+            <a:r>
+              <a:rPr lang="en-US" sz="2000" dirty="0" smtClean="0"/>
+              <a:t>they </a:t>
+            </a:r>
+            <a:r>
+              <a:rPr lang="en-US" sz="2000" dirty="0" smtClean="0"/>
+              <a:t>are not integrated </a:t>
+            </a:r>
+            <a:r>
+              <a:rPr lang="en-US" sz="2000" dirty="0" smtClean="0"/>
+              <a:t>with </a:t>
             </a:r>
             <a:r>
               <a:rPr lang="en-US" sz="2000" dirty="0" err="1" smtClean="0"/>
@@ -8996,15 +8986,15 @@
             </a:r>
             <a:r>
               <a:rPr lang="en-US" sz="2000" dirty="0" smtClean="0"/>
-              <a:t> (</a:t>
-            </a:r>
-            <a:r>
-              <a:rPr lang="en-US" sz="2000" dirty="0" err="1" smtClean="0"/>
-              <a:t>afaik</a:t>
+              <a:t> </a:t>
             </a:r>
             <a:r>
               <a:rPr lang="en-US" sz="2000" dirty="0" smtClean="0"/>
-              <a:t>). In other words, </a:t>
+              <a:t>(unless someone writes scripts to do so). </a:t>
+            </a:r>
+            <a:r>
+              <a:rPr lang="en-US" sz="2000" dirty="0" smtClean="0"/>
+              <a:t>In other words, </a:t>
             </a:r>
             <a:r>
               <a:rPr lang="en-US" sz="2000" dirty="0" err="1" smtClean="0"/>
@@ -9023,12 +9013,8 @@
               <a:t> files </a:t>
             </a:r>
             <a:r>
-              <a:rPr lang="en-US" sz="2000" dirty="0" err="1" smtClean="0"/>
-              <a:t>automagically</a:t>
-            </a:r>
-            <a:r>
               <a:rPr lang="en-US" sz="2000" dirty="0" smtClean="0"/>
-              <a:t>.</a:t>
+              <a:t>automatically.</a:t>
             </a:r>
             <a:endParaRPr lang="en-US" sz="2000" dirty="0"/>
           </a:p>
@@ -9563,8 +9549,13 @@
             <a:pPr lvl="1"/>
             <a:r>
               <a:rPr lang="en-US" sz="2000" dirty="0" smtClean="0"/>
-              <a:t>In other words, check for updates from the remote repo w/o altering your own local repo</a:t>
-            </a:r>
+              <a:t>In other words, check for updates from the remote repo w/o altering your own local </a:t>
+            </a:r>
+            <a:r>
+              <a:rPr lang="en-US" sz="2000" dirty="0" smtClean="0"/>
+              <a:t>repo (refresh)</a:t>
+            </a:r>
+            <a:endParaRPr lang="en-US" sz="2000" dirty="0" smtClean="0"/>
           </a:p>
           <a:p>
             <a:r>
@@ -9675,7 +9666,19 @@
           <a:p>
             <a:r>
               <a:rPr lang="en-US" sz="2400" dirty="0" smtClean="0"/>
-              <a:t>Technically, it is a tag that is always set to the newest commit made on that branch</a:t>
+              <a:t>It is essentially </a:t>
+            </a:r>
+            <a:r>
+              <a:rPr lang="en-US" sz="2400" dirty="0" smtClean="0"/>
+              <a:t>a </a:t>
+            </a:r>
+            <a:r>
+              <a:rPr lang="en-US" sz="2400" dirty="0" smtClean="0"/>
+              <a:t>special tag </a:t>
+            </a:r>
+            <a:r>
+              <a:rPr lang="en-US" sz="2400" dirty="0" smtClean="0"/>
+              <a:t>that is always set to the newest commit made on that branch</a:t>
             </a:r>
           </a:p>
           <a:p>
@@ -9856,33 +9859,23 @@
             <a:pPr lvl="1"/>
             <a:r>
               <a:rPr lang="en-US" sz="2000" dirty="0" smtClean="0"/>
-              <a:t>You can also checkout a specific file from any commit/tag/branch (assuming you know its name)</a:t>
-            </a:r>
+              <a:t>You can also checkout a specific file from any commit/tag/branch (assuming you know its </a:t>
+            </a:r>
+            <a:r>
+              <a:rPr lang="en-US" sz="2000" dirty="0" smtClean="0"/>
+              <a:t>name</a:t>
+            </a:r>
+            <a:endParaRPr lang="en-US" sz="2000" dirty="0"/>
           </a:p>
           <a:p>
             <a:pPr lvl="1"/>
             <a:r>
-              <a:rPr lang="en-US" sz="2000" b="1" dirty="0" smtClean="0"/>
-              <a:t>Note</a:t>
-            </a:r>
-            <a:r>
               <a:rPr lang="en-US" sz="2000" dirty="0" smtClean="0"/>
-              <a:t>: You can only do a checkout through the </a:t>
-            </a:r>
-            <a:r>
-              <a:rPr lang="en-US" sz="2000" dirty="0" err="1" smtClean="0"/>
-              <a:t>Git</a:t>
+              <a:t> You </a:t>
             </a:r>
             <a:r>
               <a:rPr lang="en-US" sz="2000" dirty="0" smtClean="0"/>
-              <a:t> Bash </a:t>
-            </a:r>
-          </a:p>
-          <a:p>
-            <a:pPr lvl="1"/>
-            <a:r>
-              <a:rPr lang="en-US" sz="2000" dirty="0" smtClean="0"/>
-              <a:t>You can also download a directory/file from any branch/commit/tag from </a:t>
+              <a:t>can also download a directory/file from any branch/commit/tag from </a:t>
             </a:r>
             <a:r>
               <a:rPr lang="en-US" sz="2000" dirty="0" err="1" smtClean="0"/>

</xml_diff>